<commit_message>
Added final version of presentation slides with YouTube link
</commit_message>
<xml_diff>
--- a/pres/6306_CaseStudy2_Pres1.pptx
+++ b/pres/6306_CaseStudy2_Pres1.pptx
@@ -11,8 +11,9 @@
     <p:sldId id="262" r:id="rId5"/>
     <p:sldId id="263" r:id="rId6"/>
     <p:sldId id="264" r:id="rId7"/>
-    <p:sldId id="265" r:id="rId8"/>
-    <p:sldId id="259" r:id="rId9"/>
+    <p:sldId id="266" r:id="rId8"/>
+    <p:sldId id="267" r:id="rId9"/>
+    <p:sldId id="259" r:id="rId10"/>
   </p:sldIdLst>
   <p:sldSz cx="9144000" cy="5143500" type="screen16x9"/>
   <p:notesSz cx="6858000" cy="9144000"/>
@@ -192,7 +193,7 @@
           <a:p>
             <a:fld id="{63937D59-5EDB-4C39-B697-625748F703B6}" type="datetimeFigureOut">
               <a:rPr lang="en-US" smtClean="0"/>
-              <a:t>12/5/2018</a:t>
+              <a:t>12/9/2018</a:t>
             </a:fld>
             <a:endParaRPr lang="en-US"/>
           </a:p>
@@ -469,7 +470,7 @@
           <a:p>
             <a:fld id="{63937D59-5EDB-4C39-B697-625748F703B6}" type="datetimeFigureOut">
               <a:rPr lang="en-US" smtClean="0"/>
-              <a:t>12/5/2018</a:t>
+              <a:t>12/9/2018</a:t>
             </a:fld>
             <a:endParaRPr lang="en-US"/>
           </a:p>
@@ -722,7 +723,7 @@
           <a:p>
             <a:fld id="{63937D59-5EDB-4C39-B697-625748F703B6}" type="datetimeFigureOut">
               <a:rPr lang="en-US" smtClean="0"/>
-              <a:t>12/5/2018</a:t>
+              <a:t>12/9/2018</a:t>
             </a:fld>
             <a:endParaRPr lang="en-US"/>
           </a:p>
@@ -892,7 +893,7 @@
           <a:p>
             <a:fld id="{63937D59-5EDB-4C39-B697-625748F703B6}" type="datetimeFigureOut">
               <a:rPr lang="en-US" smtClean="0"/>
-              <a:t>12/5/2018</a:t>
+              <a:t>12/9/2018</a:t>
             </a:fld>
             <a:endParaRPr lang="en-US"/>
           </a:p>
@@ -1072,7 +1073,7 @@
           <a:p>
             <a:fld id="{63937D59-5EDB-4C39-B697-625748F703B6}" type="datetimeFigureOut">
               <a:rPr lang="en-US" smtClean="0"/>
-              <a:t>12/5/2018</a:t>
+              <a:t>12/9/2018</a:t>
             </a:fld>
             <a:endParaRPr lang="en-US"/>
           </a:p>
@@ -1670,7 +1671,7 @@
           <a:p>
             <a:fld id="{63937D59-5EDB-4C39-B697-625748F703B6}" type="datetimeFigureOut">
               <a:rPr lang="en-US" smtClean="0"/>
-              <a:t>12/5/2018</a:t>
+              <a:t>12/9/2018</a:t>
             </a:fld>
             <a:endParaRPr lang="en-US"/>
           </a:p>
@@ -1840,7 +1841,7 @@
           <a:p>
             <a:fld id="{63937D59-5EDB-4C39-B697-625748F703B6}" type="datetimeFigureOut">
               <a:rPr lang="en-US" smtClean="0"/>
-              <a:t>12/5/2018</a:t>
+              <a:t>12/9/2018</a:t>
             </a:fld>
             <a:endParaRPr lang="en-US"/>
           </a:p>
@@ -2086,7 +2087,7 @@
           <a:p>
             <a:fld id="{63937D59-5EDB-4C39-B697-625748F703B6}" type="datetimeFigureOut">
               <a:rPr lang="en-US" smtClean="0"/>
-              <a:t>12/5/2018</a:t>
+              <a:t>12/9/2018</a:t>
             </a:fld>
             <a:endParaRPr lang="en-US"/>
           </a:p>
@@ -2374,7 +2375,7 @@
           <a:p>
             <a:fld id="{63937D59-5EDB-4C39-B697-625748F703B6}" type="datetimeFigureOut">
               <a:rPr lang="en-US" smtClean="0"/>
-              <a:t>12/5/2018</a:t>
+              <a:t>12/9/2018</a:t>
             </a:fld>
             <a:endParaRPr lang="en-US"/>
           </a:p>
@@ -2796,7 +2797,7 @@
           <a:p>
             <a:fld id="{63937D59-5EDB-4C39-B697-625748F703B6}" type="datetimeFigureOut">
               <a:rPr lang="en-US" smtClean="0"/>
-              <a:t>12/5/2018</a:t>
+              <a:t>12/9/2018</a:t>
             </a:fld>
             <a:endParaRPr lang="en-US"/>
           </a:p>
@@ -2914,7 +2915,7 @@
           <a:p>
             <a:fld id="{63937D59-5EDB-4C39-B697-625748F703B6}" type="datetimeFigureOut">
               <a:rPr lang="en-US" smtClean="0"/>
-              <a:t>12/5/2018</a:t>
+              <a:t>12/9/2018</a:t>
             </a:fld>
             <a:endParaRPr lang="en-US"/>
           </a:p>
@@ -3418,7 +3419,7 @@
           <a:p>
             <a:fld id="{63937D59-5EDB-4C39-B697-625748F703B6}" type="datetimeFigureOut">
               <a:rPr lang="en-US" smtClean="0"/>
-              <a:t>12/5/2018</a:t>
+              <a:t>12/9/2018</a:t>
             </a:fld>
             <a:endParaRPr lang="en-US"/>
           </a:p>
@@ -3893,25 +3894,11 @@
                 <a:ea typeface="맑은 고딕" pitchFamily="50" charset="-127"/>
                 <a:cs typeface="Arial" pitchFamily="34" charset="0"/>
               </a:rPr>
-              <a:t> Modeling Attrition</a:t>
+              <a:t> Talent Management</a:t>
             </a:r>
           </a:p>
           <a:p>
             <a:pPr algn="r"/>
-            <a:r>
-              <a:rPr lang="en-US" altLang="ko-KR" sz="2400" b="1" dirty="0" smtClean="0">
-                <a:solidFill>
-                  <a:schemeClr val="tx1">
-                    <a:lumMod val="75000"/>
-                    <a:lumOff val="25000"/>
-                  </a:schemeClr>
-                </a:solidFill>
-                <a:latin typeface="Arial" pitchFamily="34" charset="0"/>
-                <a:ea typeface="맑은 고딕" pitchFamily="50" charset="-127"/>
-                <a:cs typeface="Arial" pitchFamily="34" charset="0"/>
-              </a:rPr>
-              <a:t>and other factors</a:t>
-            </a:r>
             <a:endParaRPr lang="en-US" altLang="ko-KR" sz="2400" b="1" dirty="0" smtClean="0">
               <a:solidFill>
                 <a:schemeClr val="tx1">
@@ -3989,7 +3976,7 @@
             </a:pPr>
             <a:r>
               <a:rPr lang="en-US" altLang="ko-KR" sz="2000" dirty="0" smtClean="0"/>
-              <a:t>Final model: 87.3% accuracy</a:t>
+              <a:t>Final model: 85% accuracy</a:t>
             </a:r>
           </a:p>
           <a:p>
@@ -4038,7 +4025,7 @@
           <a:p>
             <a:r>
               <a:rPr lang="en-US" dirty="0" smtClean="0"/>
-              <a:t>Introduction</a:t>
+              <a:t>Overview</a:t>
             </a:r>
             <a:endParaRPr lang="en-US" dirty="0"/>
           </a:p>
@@ -4159,11 +4146,7 @@
             </a:pPr>
             <a:r>
               <a:rPr lang="en-US" altLang="ko-KR" sz="2000" dirty="0" smtClean="0"/>
-              <a:t>Differences not </a:t>
-            </a:r>
-            <a:r>
-              <a:rPr lang="en-US" altLang="ko-KR" sz="2000" dirty="0" smtClean="0"/>
-              <a:t>statistically significant</a:t>
+              <a:t>Differences not statistically significant</a:t>
             </a:r>
           </a:p>
           <a:p>
@@ -4346,6 +4329,30 @@
           </a:extLst>
         </p:spPr>
       </p:pic>
+      <p:pic>
+        <p:nvPicPr>
+          <p:cNvPr id="6" name="Picture 5"/>
+          <p:cNvPicPr>
+            <a:picLocks noChangeAspect="1"/>
+          </p:cNvPicPr>
+          <p:nvPr/>
+        </p:nvPicPr>
+        <p:blipFill>
+          <a:blip r:embed="rId4"/>
+          <a:stretch>
+            <a:fillRect/>
+          </a:stretch>
+        </p:blipFill>
+        <p:spPr>
+          <a:xfrm>
+            <a:off x="251521" y="3308048"/>
+            <a:ext cx="2890774" cy="1423942"/>
+          </a:xfrm>
+          <a:prstGeom prst="rect">
+            <a:avLst/>
+          </a:prstGeom>
+        </p:spPr>
+      </p:pic>
     </p:spTree>
     <p:extLst>
       <p:ext uri="{BB962C8B-B14F-4D97-AF65-F5344CB8AC3E}">
@@ -4409,11 +4416,7 @@
             </a:pPr>
             <a:r>
               <a:rPr lang="en-US" altLang="ko-KR" sz="2000" dirty="0" smtClean="0"/>
-              <a:t>Differences not </a:t>
-            </a:r>
-            <a:r>
-              <a:rPr lang="en-US" altLang="ko-KR" sz="2000" dirty="0" smtClean="0"/>
-              <a:t>statistically significant</a:t>
+              <a:t>Differences not statistically significant</a:t>
             </a:r>
           </a:p>
           <a:p>
@@ -4589,6 +4592,30 @@
           </a:extLst>
         </p:spPr>
       </p:pic>
+      <p:pic>
+        <p:nvPicPr>
+          <p:cNvPr id="6" name="Picture 5"/>
+          <p:cNvPicPr>
+            <a:picLocks noChangeAspect="1"/>
+          </p:cNvPicPr>
+          <p:nvPr/>
+        </p:nvPicPr>
+        <p:blipFill>
+          <a:blip r:embed="rId4"/>
+          <a:stretch>
+            <a:fillRect/>
+          </a:stretch>
+        </p:blipFill>
+        <p:spPr>
+          <a:xfrm>
+            <a:off x="107504" y="3363837"/>
+            <a:ext cx="3247088" cy="1386947"/>
+          </a:xfrm>
+          <a:prstGeom prst="rect">
+            <a:avLst/>
+          </a:prstGeom>
+        </p:spPr>
+      </p:pic>
     </p:spTree>
     <p:extLst>
       <p:ext uri="{BB962C8B-B14F-4D97-AF65-F5344CB8AC3E}">
@@ -4652,11 +4679,7 @@
             </a:pPr>
             <a:r>
               <a:rPr lang="en-US" altLang="ko-KR" sz="2000" dirty="0" smtClean="0"/>
-              <a:t>Differences not </a:t>
-            </a:r>
-            <a:r>
-              <a:rPr lang="en-US" altLang="ko-KR" sz="2000" dirty="0" smtClean="0"/>
-              <a:t>statistically significant</a:t>
+              <a:t>Differences not statistically significant</a:t>
             </a:r>
           </a:p>
           <a:p>
@@ -4832,6 +4855,30 @@
           </a:extLst>
         </p:spPr>
       </p:pic>
+      <p:pic>
+        <p:nvPicPr>
+          <p:cNvPr id="6" name="Picture 5"/>
+          <p:cNvPicPr>
+            <a:picLocks noChangeAspect="1"/>
+          </p:cNvPicPr>
+          <p:nvPr/>
+        </p:nvPicPr>
+        <p:blipFill>
+          <a:blip r:embed="rId4"/>
+          <a:stretch>
+            <a:fillRect/>
+          </a:stretch>
+        </p:blipFill>
+        <p:spPr>
+          <a:xfrm>
+            <a:off x="107504" y="3435846"/>
+            <a:ext cx="3255837" cy="1235792"/>
+          </a:xfrm>
+          <a:prstGeom prst="rect">
+            <a:avLst/>
+          </a:prstGeom>
+        </p:spPr>
+      </p:pic>
     </p:spTree>
     <p:extLst>
       <p:ext uri="{BB962C8B-B14F-4D97-AF65-F5344CB8AC3E}">
@@ -4881,8 +4928,8 @@
         </p:nvSpPr>
         <p:spPr>
           <a:xfrm>
-            <a:off x="405880" y="1376213"/>
-            <a:ext cx="8496944" cy="2995737"/>
+            <a:off x="-180528" y="1376213"/>
+            <a:ext cx="3672408" cy="2995737"/>
           </a:xfrm>
         </p:spPr>
         <p:txBody>
@@ -4894,8 +4941,8 @@
               <a:buChar char="•"/>
             </a:pPr>
             <a:r>
-              <a:rPr lang="en-US" altLang="ko-KR" sz="2000" dirty="0"/>
-              <a:t>Years since last promotion &amp; Job Satisfaction</a:t>
+              <a:rPr lang="en-US" altLang="ko-KR" sz="2000" dirty="0" smtClean="0"/>
+              <a:t>Attrition </a:t>
             </a:r>
           </a:p>
           <a:p>
@@ -4905,116 +4952,8 @@
             </a:pPr>
             <a:r>
               <a:rPr lang="en-US" altLang="ko-KR" sz="2000" dirty="0" smtClean="0"/>
-              <a:t>Final model: 87.3% accuracy</a:t>
-            </a:r>
-          </a:p>
-          <a:p>
-            <a:pPr marL="285750" indent="-285750">
-              <a:buFont typeface="Arial" panose="020B0604020202020204" pitchFamily="34" charset="0"/>
-              <a:buChar char="•"/>
-            </a:pPr>
-            <a:endParaRPr lang="en-US" altLang="ko-KR" sz="2000" dirty="0"/>
-          </a:p>
-          <a:p>
-            <a:pPr marL="285750" indent="-285750">
-              <a:buFont typeface="Arial" panose="020B0604020202020204" pitchFamily="34" charset="0"/>
-              <a:buChar char="•"/>
-            </a:pPr>
-            <a:r>
-              <a:rPr lang="en-US" sz="2000" dirty="0" smtClean="0"/>
-              <a:t>business </a:t>
-            </a:r>
-            <a:r>
-              <a:rPr lang="en-US" sz="2000" dirty="0"/>
-              <a:t>travel, commute distance, </a:t>
-            </a:r>
-            <a:r>
-              <a:rPr lang="en-US" sz="2000" dirty="0" smtClean="0"/>
-              <a:t>environment satisfaction,</a:t>
-            </a:r>
-          </a:p>
-          <a:p>
-            <a:pPr marL="285750" indent="-285750">
-              <a:buFont typeface="Arial" panose="020B0604020202020204" pitchFamily="34" charset="0"/>
-              <a:buChar char="•"/>
-            </a:pPr>
-            <a:r>
-              <a:rPr lang="en-US" sz="2000" dirty="0" smtClean="0"/>
-              <a:t>job </a:t>
-            </a:r>
-            <a:r>
-              <a:rPr lang="en-US" sz="2000" dirty="0"/>
-              <a:t>involvement, job role</a:t>
-            </a:r>
-            <a:r>
-              <a:rPr lang="en-US" sz="2000" dirty="0" smtClean="0"/>
-              <a:t>, job satisfaction, marital </a:t>
-            </a:r>
-            <a:r>
-              <a:rPr lang="en-US" sz="2000" dirty="0"/>
-              <a:t>status</a:t>
-            </a:r>
-            <a:r>
-              <a:rPr lang="en-US" sz="2000" dirty="0" smtClean="0"/>
-              <a:t>,</a:t>
-            </a:r>
-          </a:p>
-          <a:p>
-            <a:pPr marL="285750" indent="-285750">
-              <a:buFont typeface="Arial" panose="020B0604020202020204" pitchFamily="34" charset="0"/>
-              <a:buChar char="•"/>
-            </a:pPr>
-            <a:r>
-              <a:rPr lang="en-US" sz="2000" dirty="0" smtClean="0"/>
-              <a:t>number </a:t>
-            </a:r>
-            <a:r>
-              <a:rPr lang="en-US" sz="2000" dirty="0"/>
-              <a:t>of companies worked, </a:t>
-            </a:r>
-            <a:r>
-              <a:rPr lang="en-US" sz="2000" dirty="0" smtClean="0"/>
-              <a:t>overtime, relationship satisfaction,</a:t>
-            </a:r>
-          </a:p>
-          <a:p>
-            <a:pPr marL="285750" indent="-285750">
-              <a:buFont typeface="Arial" panose="020B0604020202020204" pitchFamily="34" charset="0"/>
-              <a:buChar char="•"/>
-            </a:pPr>
-            <a:r>
-              <a:rPr lang="en-US" sz="2000" dirty="0" smtClean="0"/>
-              <a:t>years </a:t>
-            </a:r>
-            <a:r>
-              <a:rPr lang="en-US" sz="2000" dirty="0"/>
-              <a:t>at </a:t>
-            </a:r>
-            <a:r>
-              <a:rPr lang="en-US" sz="2000" dirty="0" smtClean="0"/>
-              <a:t>company</a:t>
-            </a:r>
-          </a:p>
-          <a:p>
-            <a:pPr marL="285750" indent="-285750">
-              <a:buFont typeface="Arial" panose="020B0604020202020204" pitchFamily="34" charset="0"/>
-              <a:buChar char="•"/>
-            </a:pPr>
-            <a:endParaRPr lang="en-US" altLang="ko-KR" sz="2000" dirty="0" smtClean="0"/>
-          </a:p>
-          <a:p>
-            <a:pPr marL="285750" indent="-285750">
-              <a:buFont typeface="Arial" panose="020B0604020202020204" pitchFamily="34" charset="0"/>
-              <a:buChar char="•"/>
-            </a:pPr>
-            <a:endParaRPr lang="en-US" altLang="ko-KR" sz="2000" dirty="0"/>
-          </a:p>
-          <a:p>
-            <a:pPr marL="285750" indent="-285750">
-              <a:buFont typeface="Arial" panose="020B0604020202020204" pitchFamily="34" charset="0"/>
-              <a:buChar char="•"/>
-            </a:pPr>
-            <a:endParaRPr lang="en-US" altLang="ko-KR" sz="2000" dirty="0" smtClean="0"/>
+              <a:t>No single factor</a:t>
+            </a:r>
           </a:p>
           <a:p>
             <a:pPr marL="285750" indent="-285750">
@@ -5045,7 +4984,7 @@
           <a:p>
             <a:r>
               <a:rPr lang="en-US" dirty="0" smtClean="0"/>
-              <a:t>Modeling Attrition</a:t>
+              <a:t>Plotting</a:t>
             </a:r>
             <a:endParaRPr lang="en-US" dirty="0"/>
           </a:p>
@@ -5053,7 +4992,7 @@
       </p:sp>
       <p:pic>
         <p:nvPicPr>
-          <p:cNvPr id="5122" name="Picture 2"/>
+          <p:cNvPr id="1027" name="Picture 3"/>
           <p:cNvPicPr>
             <a:picLocks noChangeAspect="1" noChangeArrowheads="1"/>
           </p:cNvPicPr>
@@ -5067,13 +5006,13 @@
               </a:ext>
             </a:extLst>
           </a:blip>
-          <a:srcRect l="2500" t="90484" r="59375" b="3663"/>
+          <a:srcRect l="23509" t="7647" r="23125" b="4924"/>
           <a:stretch/>
         </p:blipFill>
         <p:spPr bwMode="auto">
           <a:xfrm>
-            <a:off x="1043608" y="4093840"/>
-            <a:ext cx="4920128" cy="494134"/>
+            <a:off x="3856705" y="993428"/>
+            <a:ext cx="4387703" cy="4043352"/>
           </a:xfrm>
           <a:prstGeom prst="rect">
             <a:avLst/>
@@ -5106,7 +5045,7 @@
     </p:spTree>
     <p:extLst>
       <p:ext uri="{BB962C8B-B14F-4D97-AF65-F5344CB8AC3E}">
-        <p14:creationId xmlns:p14="http://schemas.microsoft.com/office/powerpoint/2010/main" val="597345054"/>
+        <p14:creationId xmlns:p14="http://schemas.microsoft.com/office/powerpoint/2010/main" val="891033854"/>
       </p:ext>
     </p:extLst>
   </p:cSld>
@@ -5142,6 +5081,377 @@
       </p:grpSpPr>
       <p:sp>
         <p:nvSpPr>
+          <p:cNvPr id="5" name="Content Placeholder 4"/>
+          <p:cNvSpPr>
+            <a:spLocks noGrp="1"/>
+          </p:cNvSpPr>
+          <p:nvPr>
+            <p:ph idx="10"/>
+          </p:nvPr>
+        </p:nvSpPr>
+        <p:spPr>
+          <a:xfrm>
+            <a:off x="405880" y="1376213"/>
+            <a:ext cx="8496944" cy="2995737"/>
+          </a:xfrm>
+        </p:spPr>
+        <p:txBody>
+          <a:bodyPr/>
+          <a:lstStyle/>
+          <a:p>
+            <a:pPr marL="285750" indent="-285750">
+              <a:buFont typeface="Arial" panose="020B0604020202020204" pitchFamily="34" charset="0"/>
+              <a:buChar char="•"/>
+            </a:pPr>
+            <a:endParaRPr lang="en-US" altLang="ko-KR" sz="2000" dirty="0" smtClean="0"/>
+          </a:p>
+          <a:p>
+            <a:pPr marL="285750" indent="-285750">
+              <a:buFont typeface="Arial" panose="020B0604020202020204" pitchFamily="34" charset="0"/>
+              <a:buChar char="•"/>
+            </a:pPr>
+            <a:endParaRPr lang="en-US" altLang="ko-KR" sz="2000" dirty="0"/>
+          </a:p>
+          <a:p>
+            <a:pPr marL="285750" indent="-285750">
+              <a:buFont typeface="Arial" panose="020B0604020202020204" pitchFamily="34" charset="0"/>
+              <a:buChar char="•"/>
+            </a:pPr>
+            <a:endParaRPr lang="en-US" altLang="ko-KR" sz="2000" dirty="0" smtClean="0"/>
+          </a:p>
+          <a:p>
+            <a:pPr marL="285750" indent="-285750">
+              <a:buFont typeface="Arial" panose="020B0604020202020204" pitchFamily="34" charset="0"/>
+              <a:buChar char="•"/>
+            </a:pPr>
+            <a:r>
+              <a:rPr lang="en-US" altLang="ko-KR" sz="2000" dirty="0" smtClean="0"/>
+              <a:t>2 models, </a:t>
+            </a:r>
+            <a:r>
+              <a:rPr lang="en-US" altLang="ko-KR" sz="2000" dirty="0" smtClean="0"/>
+              <a:t>85% to 87.3% Accuracy</a:t>
+            </a:r>
+          </a:p>
+          <a:p>
+            <a:pPr marL="285750" indent="-285750">
+              <a:buFont typeface="Arial" panose="020B0604020202020204" pitchFamily="34" charset="0"/>
+              <a:buChar char="•"/>
+            </a:pPr>
+            <a:endParaRPr lang="en-US" altLang="ko-KR" sz="1000" dirty="0" smtClean="0"/>
+          </a:p>
+          <a:p>
+            <a:pPr marL="285750" indent="-285750">
+              <a:buFont typeface="Arial" panose="020B0604020202020204" pitchFamily="34" charset="0"/>
+              <a:buChar char="•"/>
+            </a:pPr>
+            <a:r>
+              <a:rPr lang="en-US" altLang="ko-KR" sz="2000" dirty="0" smtClean="0"/>
+              <a:t>Final </a:t>
+            </a:r>
+            <a:r>
+              <a:rPr lang="en-US" altLang="ko-KR" sz="2000" dirty="0" smtClean="0"/>
+              <a:t>model: </a:t>
+            </a:r>
+            <a:r>
+              <a:rPr lang="en-US" altLang="ko-KR" sz="2000" dirty="0" smtClean="0"/>
+              <a:t>85% accuracy</a:t>
+            </a:r>
+          </a:p>
+          <a:p>
+            <a:pPr marL="285750" indent="-285750">
+              <a:buFont typeface="Arial" panose="020B0604020202020204" pitchFamily="34" charset="0"/>
+              <a:buChar char="•"/>
+            </a:pPr>
+            <a:r>
+              <a:rPr lang="en-US" sz="2000" dirty="0" smtClean="0"/>
+              <a:t>Job Involvement, Overtime, Marital Status, Job Role,</a:t>
+            </a:r>
+          </a:p>
+          <a:p>
+            <a:pPr marL="285750" indent="-285750">
+              <a:buFont typeface="Arial" panose="020B0604020202020204" pitchFamily="34" charset="0"/>
+              <a:buChar char="•"/>
+            </a:pPr>
+            <a:r>
+              <a:rPr lang="en-US" sz="2000" dirty="0" smtClean="0"/>
+              <a:t>Number of Companies Worked For</a:t>
+            </a:r>
+            <a:endParaRPr lang="en-US" altLang="ko-KR" sz="2000" dirty="0"/>
+          </a:p>
+          <a:p>
+            <a:pPr marL="285750" indent="-285750">
+              <a:buFont typeface="Arial" panose="020B0604020202020204" pitchFamily="34" charset="0"/>
+              <a:buChar char="•"/>
+            </a:pPr>
+            <a:endParaRPr lang="en-US" altLang="ko-KR" sz="2000" dirty="0" smtClean="0"/>
+          </a:p>
+          <a:p>
+            <a:pPr marL="285750" indent="-285750">
+              <a:buFont typeface="Arial" panose="020B0604020202020204" pitchFamily="34" charset="0"/>
+              <a:buChar char="•"/>
+            </a:pPr>
+            <a:endParaRPr lang="en-US" altLang="ko-KR" sz="2000" dirty="0"/>
+          </a:p>
+          <a:p>
+            <a:pPr marL="285750" indent="-285750">
+              <a:buFont typeface="Arial" panose="020B0604020202020204" pitchFamily="34" charset="0"/>
+              <a:buChar char="•"/>
+            </a:pPr>
+            <a:endParaRPr lang="ko-KR" altLang="en-US" dirty="0">
+              <a:latin typeface="Arial" pitchFamily="34" charset="0"/>
+              <a:cs typeface="Arial" pitchFamily="34" charset="0"/>
+            </a:endParaRPr>
+          </a:p>
+        </p:txBody>
+      </p:sp>
+      <p:sp>
+        <p:nvSpPr>
+          <p:cNvPr id="3" name="Title 2"/>
+          <p:cNvSpPr>
+            <a:spLocks noGrp="1"/>
+          </p:cNvSpPr>
+          <p:nvPr>
+            <p:ph type="title"/>
+          </p:nvPr>
+        </p:nvSpPr>
+        <p:spPr/>
+        <p:txBody>
+          <a:bodyPr/>
+          <a:lstStyle/>
+          <a:p>
+            <a:r>
+              <a:rPr lang="en-US" dirty="0" smtClean="0"/>
+              <a:t>Modeling </a:t>
+            </a:r>
+            <a:r>
+              <a:rPr lang="en-US" dirty="0" smtClean="0"/>
+              <a:t>Attrition</a:t>
+            </a:r>
+            <a:endParaRPr lang="en-US" dirty="0"/>
+          </a:p>
+        </p:txBody>
+      </p:sp>
+      <p:pic>
+        <p:nvPicPr>
+          <p:cNvPr id="1026" name="Picture 2"/>
+          <p:cNvPicPr>
+            <a:picLocks noChangeAspect="1" noChangeArrowheads="1"/>
+          </p:cNvPicPr>
+          <p:nvPr/>
+        </p:nvPicPr>
+        <p:blipFill rotWithShape="1">
+          <a:blip r:embed="rId2">
+            <a:extLst>
+              <a:ext uri="{28A0092B-C50C-407E-A947-70E740481C1C}">
+                <a14:useLocalDpi xmlns:a14="http://schemas.microsoft.com/office/drawing/2010/main" val="0"/>
+              </a:ext>
+            </a:extLst>
+          </a:blip>
+          <a:srcRect l="26348" t="86275" r="50080" b="4709"/>
+          <a:stretch/>
+        </p:blipFill>
+        <p:spPr bwMode="auto">
+          <a:xfrm>
+            <a:off x="1091495" y="1545125"/>
+            <a:ext cx="3912553" cy="810601"/>
+          </a:xfrm>
+          <a:prstGeom prst="rect">
+            <a:avLst/>
+          </a:prstGeom>
+          <a:noFill/>
+          <a:ln>
+            <a:noFill/>
+          </a:ln>
+          <a:extLst>
+            <a:ext uri="{909E8E84-426E-40DD-AFC4-6F175D3DCCD1}">
+              <a14:hiddenFill xmlns:a14="http://schemas.microsoft.com/office/drawing/2010/main">
+                <a:solidFill>
+                  <a:schemeClr val="accent1"/>
+                </a:solidFill>
+              </a14:hiddenFill>
+            </a:ext>
+            <a:ext uri="{91240B29-F687-4F45-9708-019B960494DF}">
+              <a14:hiddenLine xmlns:a14="http://schemas.microsoft.com/office/drawing/2010/main" w="9525">
+                <a:solidFill>
+                  <a:schemeClr val="tx1"/>
+                </a:solidFill>
+                <a:miter lim="800000"/>
+                <a:headEnd/>
+                <a:tailEnd/>
+              </a14:hiddenLine>
+            </a:ext>
+          </a:extLst>
+        </p:spPr>
+      </p:pic>
+      <p:pic>
+        <p:nvPicPr>
+          <p:cNvPr id="2050" name="Picture 2"/>
+          <p:cNvPicPr>
+            <a:picLocks noChangeAspect="1" noChangeArrowheads="1"/>
+          </p:cNvPicPr>
+          <p:nvPr/>
+        </p:nvPicPr>
+        <p:blipFill rotWithShape="1">
+          <a:blip r:embed="rId3">
+            <a:extLst>
+              <a:ext uri="{28A0092B-C50C-407E-A947-70E740481C1C}">
+                <a14:useLocalDpi xmlns:a14="http://schemas.microsoft.com/office/drawing/2010/main" val="0"/>
+              </a:ext>
+            </a:extLst>
+          </a:blip>
+          <a:srcRect l="10115" t="55999" r="65362" b="40393"/>
+          <a:stretch/>
+        </p:blipFill>
+        <p:spPr bwMode="auto">
+          <a:xfrm>
+            <a:off x="6012160" y="1545125"/>
+            <a:ext cx="2322286" cy="304800"/>
+          </a:xfrm>
+          <a:prstGeom prst="rect">
+            <a:avLst/>
+          </a:prstGeom>
+          <a:noFill/>
+          <a:ln>
+            <a:noFill/>
+          </a:ln>
+          <a:extLst>
+            <a:ext uri="{909E8E84-426E-40DD-AFC4-6F175D3DCCD1}">
+              <a14:hiddenFill xmlns:a14="http://schemas.microsoft.com/office/drawing/2010/main">
+                <a:solidFill>
+                  <a:schemeClr val="accent1"/>
+                </a:solidFill>
+              </a14:hiddenFill>
+            </a:ext>
+            <a:ext uri="{91240B29-F687-4F45-9708-019B960494DF}">
+              <a14:hiddenLine xmlns:a14="http://schemas.microsoft.com/office/drawing/2010/main" w="9525">
+                <a:solidFill>
+                  <a:schemeClr val="tx1"/>
+                </a:solidFill>
+                <a:miter lim="800000"/>
+                <a:headEnd/>
+                <a:tailEnd/>
+              </a14:hiddenLine>
+            </a:ext>
+          </a:extLst>
+        </p:spPr>
+      </p:pic>
+      <p:sp>
+        <p:nvSpPr>
+          <p:cNvPr id="6" name="Content Placeholder 4"/>
+          <p:cNvSpPr>
+            <a:spLocks noGrp="1"/>
+          </p:cNvSpPr>
+          <p:nvPr>
+            <p:ph idx="10"/>
+          </p:nvPr>
+        </p:nvSpPr>
+        <p:spPr>
+          <a:xfrm>
+            <a:off x="1535603" y="1131590"/>
+            <a:ext cx="3024336" cy="413535"/>
+          </a:xfrm>
+        </p:spPr>
+        <p:txBody>
+          <a:bodyPr/>
+          <a:lstStyle/>
+          <a:p>
+            <a:r>
+              <a:rPr lang="en-US" altLang="ko-KR" sz="2000" dirty="0" smtClean="0"/>
+              <a:t>Logistic Regression</a:t>
+            </a:r>
+            <a:endParaRPr lang="en-US" altLang="ko-KR" sz="800" dirty="0" smtClean="0"/>
+          </a:p>
+          <a:p>
+            <a:pPr marL="285750" indent="-285750">
+              <a:buFont typeface="Arial" panose="020B0604020202020204" pitchFamily="34" charset="0"/>
+              <a:buChar char="•"/>
+            </a:pPr>
+            <a:endParaRPr lang="ko-KR" altLang="en-US" dirty="0">
+              <a:latin typeface="Arial" pitchFamily="34" charset="0"/>
+              <a:cs typeface="Arial" pitchFamily="34" charset="0"/>
+            </a:endParaRPr>
+          </a:p>
+        </p:txBody>
+      </p:sp>
+      <p:sp>
+        <p:nvSpPr>
+          <p:cNvPr id="7" name="Content Placeholder 4"/>
+          <p:cNvSpPr>
+            <a:spLocks noGrp="1"/>
+          </p:cNvSpPr>
+          <p:nvPr>
+            <p:ph idx="10"/>
+          </p:nvPr>
+        </p:nvSpPr>
+        <p:spPr>
+          <a:xfrm>
+            <a:off x="5220072" y="1150103"/>
+            <a:ext cx="3600400" cy="413535"/>
+          </a:xfrm>
+        </p:spPr>
+        <p:txBody>
+          <a:bodyPr/>
+          <a:lstStyle/>
+          <a:p>
+            <a:pPr algn="ctr"/>
+            <a:r>
+              <a:rPr lang="en-US" altLang="ko-KR" sz="2000" dirty="0" smtClean="0"/>
+              <a:t>k-Nearest Neighbors</a:t>
+            </a:r>
+            <a:endParaRPr lang="en-US" altLang="ko-KR" sz="800" dirty="0" smtClean="0"/>
+          </a:p>
+          <a:p>
+            <a:pPr marL="285750" indent="-285750">
+              <a:buFont typeface="Arial" panose="020B0604020202020204" pitchFamily="34" charset="0"/>
+              <a:buChar char="•"/>
+            </a:pPr>
+            <a:endParaRPr lang="ko-KR" altLang="en-US" dirty="0">
+              <a:latin typeface="Arial" pitchFamily="34" charset="0"/>
+              <a:cs typeface="Arial" pitchFamily="34" charset="0"/>
+            </a:endParaRPr>
+          </a:p>
+        </p:txBody>
+      </p:sp>
+    </p:spTree>
+    <p:extLst>
+      <p:ext uri="{BB962C8B-B14F-4D97-AF65-F5344CB8AC3E}">
+        <p14:creationId xmlns:p14="http://schemas.microsoft.com/office/powerpoint/2010/main" val="2530454801"/>
+      </p:ext>
+    </p:extLst>
+  </p:cSld>
+  <p:clrMapOvr>
+    <a:masterClrMapping/>
+  </p:clrMapOvr>
+  <p:timing>
+    <p:tnLst>
+      <p:par>
+        <p:cTn id="1" dur="indefinite" restart="never" nodeType="tmRoot"/>
+      </p:par>
+    </p:tnLst>
+  </p:timing>
+</p:sld>
+</file>
+
+<file path=ppt/slides/slide8.xml><?xml version="1.0" encoding="utf-8"?>
+<p:sld xmlns:a="http://schemas.openxmlformats.org/drawingml/2006/main" xmlns:r="http://schemas.openxmlformats.org/officeDocument/2006/relationships" xmlns:p="http://schemas.openxmlformats.org/presentationml/2006/main">
+  <p:cSld>
+    <p:spTree>
+      <p:nvGrpSpPr>
+        <p:cNvPr id="1" name=""/>
+        <p:cNvGrpSpPr/>
+        <p:nvPr/>
+      </p:nvGrpSpPr>
+      <p:grpSpPr>
+        <a:xfrm>
+          <a:off x="0" y="0"/>
+          <a:ext cx="0" cy="0"/>
+          <a:chOff x="0" y="0"/>
+          <a:chExt cx="0" cy="0"/>
+        </a:xfrm>
+      </p:grpSpPr>
+      <p:sp>
+        <p:nvSpPr>
           <p:cNvPr id="3" name="Title 2"/>
           <p:cNvSpPr>
             <a:spLocks noGrp="1"/>
@@ -5203,7 +5513,20 @@
           <a:p>
             <a:r>
               <a:rPr lang="en-US" altLang="ko-KR" dirty="0"/>
-              <a:t>https://www.free-powerpoint-templates-design.com/abstract-green-background-for-streaks-design-powerpoint-templates/</a:t>
+              <a:t>https://www.free-powerpoint-templates-design.com/abstract-green-background-for-streaks-design-powerpoint-templates</a:t>
+            </a:r>
+            <a:r>
+              <a:rPr lang="en-US" altLang="ko-KR" dirty="0" smtClean="0"/>
+              <a:t>/</a:t>
+            </a:r>
+          </a:p>
+          <a:p>
+            <a:endParaRPr lang="en-US" altLang="ko-KR" dirty="0" smtClean="0"/>
+          </a:p>
+          <a:p>
+            <a:r>
+              <a:rPr lang="en-US" altLang="ko-KR" dirty="0"/>
+              <a:t>https://youtu.be/L2MqJn9BWqw</a:t>
             </a:r>
             <a:endParaRPr lang="en-US" altLang="ko-KR" dirty="0" smtClean="0"/>
           </a:p>

</xml_diff>